<commit_message>
aktuelle updates vom Laptop zur Masterarbeit
</commit_message>
<xml_diff>
--- a/PP_BILDER.pptx
+++ b/PP_BILDER.pptx
@@ -107,6 +107,11 @@
       </a:defRPr>
     </a:lvl9pPr>
   </p:defaultTextStyle>
+  <p:extLst>
+    <p:ext uri="{EFAFB233-063F-42B5-8137-9DF3F51BA10A}">
+      <p15:sldGuideLst xmlns:p15="http://schemas.microsoft.com/office/powerpoint/2012/main"/>
+    </p:ext>
+  </p:extLst>
 </p:presentation>
 </file>
 
@@ -152,10 +157,9 @@
           </a:lstStyle>
           <a:p>
             <a:r>
-              <a:rPr lang="de-DE" smtClean="0"/>
+              <a:rPr lang="de-DE"/>
               <a:t>Titelmasterformat durch Klicken bearbeiten</a:t>
             </a:r>
-            <a:endParaRPr lang="de-DE"/>
           </a:p>
         </p:txBody>
       </p:sp>
@@ -217,10 +221,9 @@
           </a:lstStyle>
           <a:p>
             <a:r>
-              <a:rPr lang="de-DE" smtClean="0"/>
+              <a:rPr lang="de-DE"/>
               <a:t>Formatvorlage des Untertitelmasters durch Klicken bearbeiten</a:t>
             </a:r>
-            <a:endParaRPr lang="de-DE"/>
           </a:p>
         </p:txBody>
       </p:sp>
@@ -241,7 +244,7 @@
           <a:p>
             <a:fld id="{9E55EBDA-1967-4094-9A77-3961DCE060C3}" type="datetimeFigureOut">
               <a:rPr lang="de-DE" smtClean="0"/>
-              <a:t>18.06.2016</a:t>
+              <a:t>30.07.2016</a:t>
             </a:fld>
             <a:endParaRPr lang="de-DE"/>
           </a:p>
@@ -335,10 +338,9 @@
           <a:lstStyle/>
           <a:p>
             <a:r>
-              <a:rPr lang="de-DE" smtClean="0"/>
+              <a:rPr lang="de-DE"/>
               <a:t>Titelmasterformat durch Klicken bearbeiten</a:t>
             </a:r>
-            <a:endParaRPr lang="de-DE"/>
           </a:p>
         </p:txBody>
       </p:sp>
@@ -359,38 +361,37 @@
           <a:p>
             <a:pPr lvl="0"/>
             <a:r>
-              <a:rPr lang="de-DE" smtClean="0"/>
+              <a:rPr lang="de-DE"/>
               <a:t>Formatvorlagen des Textmasters bearbeiten</a:t>
             </a:r>
           </a:p>
           <a:p>
             <a:pPr lvl="1"/>
             <a:r>
-              <a:rPr lang="de-DE" smtClean="0"/>
+              <a:rPr lang="de-DE"/>
               <a:t>Zweite Ebene</a:t>
             </a:r>
           </a:p>
           <a:p>
             <a:pPr lvl="2"/>
             <a:r>
-              <a:rPr lang="de-DE" smtClean="0"/>
+              <a:rPr lang="de-DE"/>
               <a:t>Dritte Ebene</a:t>
             </a:r>
           </a:p>
           <a:p>
             <a:pPr lvl="3"/>
             <a:r>
-              <a:rPr lang="de-DE" smtClean="0"/>
+              <a:rPr lang="de-DE"/>
               <a:t>Vierte Ebene</a:t>
             </a:r>
           </a:p>
           <a:p>
             <a:pPr lvl="4"/>
             <a:r>
-              <a:rPr lang="de-DE" smtClean="0"/>
+              <a:rPr lang="de-DE"/>
               <a:t>Fünfte Ebene</a:t>
             </a:r>
-            <a:endParaRPr lang="de-DE"/>
           </a:p>
         </p:txBody>
       </p:sp>
@@ -411,7 +412,7 @@
           <a:p>
             <a:fld id="{9E55EBDA-1967-4094-9A77-3961DCE060C3}" type="datetimeFigureOut">
               <a:rPr lang="de-DE" smtClean="0"/>
-              <a:t>18.06.2016</a:t>
+              <a:t>30.07.2016</a:t>
             </a:fld>
             <a:endParaRPr lang="de-DE"/>
           </a:p>
@@ -510,10 +511,9 @@
           <a:lstStyle/>
           <a:p>
             <a:r>
-              <a:rPr lang="de-DE" smtClean="0"/>
+              <a:rPr lang="de-DE"/>
               <a:t>Titelmasterformat durch Klicken bearbeiten</a:t>
             </a:r>
-            <a:endParaRPr lang="de-DE"/>
           </a:p>
         </p:txBody>
       </p:sp>
@@ -539,38 +539,37 @@
           <a:p>
             <a:pPr lvl="0"/>
             <a:r>
-              <a:rPr lang="de-DE" smtClean="0"/>
+              <a:rPr lang="de-DE"/>
               <a:t>Formatvorlagen des Textmasters bearbeiten</a:t>
             </a:r>
           </a:p>
           <a:p>
             <a:pPr lvl="1"/>
             <a:r>
-              <a:rPr lang="de-DE" smtClean="0"/>
+              <a:rPr lang="de-DE"/>
               <a:t>Zweite Ebene</a:t>
             </a:r>
           </a:p>
           <a:p>
             <a:pPr lvl="2"/>
             <a:r>
-              <a:rPr lang="de-DE" smtClean="0"/>
+              <a:rPr lang="de-DE"/>
               <a:t>Dritte Ebene</a:t>
             </a:r>
           </a:p>
           <a:p>
             <a:pPr lvl="3"/>
             <a:r>
-              <a:rPr lang="de-DE" smtClean="0"/>
+              <a:rPr lang="de-DE"/>
               <a:t>Vierte Ebene</a:t>
             </a:r>
           </a:p>
           <a:p>
             <a:pPr lvl="4"/>
             <a:r>
-              <a:rPr lang="de-DE" smtClean="0"/>
+              <a:rPr lang="de-DE"/>
               <a:t>Fünfte Ebene</a:t>
             </a:r>
-            <a:endParaRPr lang="de-DE"/>
           </a:p>
         </p:txBody>
       </p:sp>
@@ -591,7 +590,7 @@
           <a:p>
             <a:fld id="{9E55EBDA-1967-4094-9A77-3961DCE060C3}" type="datetimeFigureOut">
               <a:rPr lang="de-DE" smtClean="0"/>
-              <a:t>18.06.2016</a:t>
+              <a:t>30.07.2016</a:t>
             </a:fld>
             <a:endParaRPr lang="de-DE"/>
           </a:p>
@@ -685,10 +684,9 @@
           <a:lstStyle/>
           <a:p>
             <a:r>
-              <a:rPr lang="de-DE" smtClean="0"/>
+              <a:rPr lang="de-DE"/>
               <a:t>Titelmasterformat durch Klicken bearbeiten</a:t>
             </a:r>
-            <a:endParaRPr lang="de-DE"/>
           </a:p>
         </p:txBody>
       </p:sp>
@@ -709,38 +707,37 @@
           <a:p>
             <a:pPr lvl="0"/>
             <a:r>
-              <a:rPr lang="de-DE" smtClean="0"/>
+              <a:rPr lang="de-DE"/>
               <a:t>Formatvorlagen des Textmasters bearbeiten</a:t>
             </a:r>
           </a:p>
           <a:p>
             <a:pPr lvl="1"/>
             <a:r>
-              <a:rPr lang="de-DE" smtClean="0"/>
+              <a:rPr lang="de-DE"/>
               <a:t>Zweite Ebene</a:t>
             </a:r>
           </a:p>
           <a:p>
             <a:pPr lvl="2"/>
             <a:r>
-              <a:rPr lang="de-DE" smtClean="0"/>
+              <a:rPr lang="de-DE"/>
               <a:t>Dritte Ebene</a:t>
             </a:r>
           </a:p>
           <a:p>
             <a:pPr lvl="3"/>
             <a:r>
-              <a:rPr lang="de-DE" smtClean="0"/>
+              <a:rPr lang="de-DE"/>
               <a:t>Vierte Ebene</a:t>
             </a:r>
           </a:p>
           <a:p>
             <a:pPr lvl="4"/>
             <a:r>
-              <a:rPr lang="de-DE" smtClean="0"/>
+              <a:rPr lang="de-DE"/>
               <a:t>Fünfte Ebene</a:t>
             </a:r>
-            <a:endParaRPr lang="de-DE"/>
           </a:p>
         </p:txBody>
       </p:sp>
@@ -761,7 +758,7 @@
           <a:p>
             <a:fld id="{9E55EBDA-1967-4094-9A77-3961DCE060C3}" type="datetimeFigureOut">
               <a:rPr lang="de-DE" smtClean="0"/>
-              <a:t>18.06.2016</a:t>
+              <a:t>30.07.2016</a:t>
             </a:fld>
             <a:endParaRPr lang="de-DE"/>
           </a:p>
@@ -864,10 +861,9 @@
           </a:lstStyle>
           <a:p>
             <a:r>
-              <a:rPr lang="de-DE" smtClean="0"/>
+              <a:rPr lang="de-DE"/>
               <a:t>Titelmasterformat durch Klicken bearbeiten</a:t>
             </a:r>
-            <a:endParaRPr lang="de-DE"/>
           </a:p>
         </p:txBody>
       </p:sp>
@@ -984,7 +980,7 @@
           <a:p>
             <a:pPr lvl="0"/>
             <a:r>
-              <a:rPr lang="de-DE" smtClean="0"/>
+              <a:rPr lang="de-DE"/>
               <a:t>Formatvorlagen des Textmasters bearbeiten</a:t>
             </a:r>
           </a:p>
@@ -1007,7 +1003,7 @@
           <a:p>
             <a:fld id="{9E55EBDA-1967-4094-9A77-3961DCE060C3}" type="datetimeFigureOut">
               <a:rPr lang="de-DE" smtClean="0"/>
-              <a:t>18.06.2016</a:t>
+              <a:t>30.07.2016</a:t>
             </a:fld>
             <a:endParaRPr lang="de-DE"/>
           </a:p>
@@ -1101,10 +1097,9 @@
           <a:lstStyle/>
           <a:p>
             <a:r>
-              <a:rPr lang="de-DE" smtClean="0"/>
+              <a:rPr lang="de-DE"/>
               <a:t>Titelmasterformat durch Klicken bearbeiten</a:t>
             </a:r>
-            <a:endParaRPr lang="de-DE"/>
           </a:p>
         </p:txBody>
       </p:sp>
@@ -1130,38 +1125,37 @@
           <a:p>
             <a:pPr lvl="0"/>
             <a:r>
-              <a:rPr lang="de-DE" smtClean="0"/>
+              <a:rPr lang="de-DE"/>
               <a:t>Formatvorlagen des Textmasters bearbeiten</a:t>
             </a:r>
           </a:p>
           <a:p>
             <a:pPr lvl="1"/>
             <a:r>
-              <a:rPr lang="de-DE" smtClean="0"/>
+              <a:rPr lang="de-DE"/>
               <a:t>Zweite Ebene</a:t>
             </a:r>
           </a:p>
           <a:p>
             <a:pPr lvl="2"/>
             <a:r>
-              <a:rPr lang="de-DE" smtClean="0"/>
+              <a:rPr lang="de-DE"/>
               <a:t>Dritte Ebene</a:t>
             </a:r>
           </a:p>
           <a:p>
             <a:pPr lvl="3"/>
             <a:r>
-              <a:rPr lang="de-DE" smtClean="0"/>
+              <a:rPr lang="de-DE"/>
               <a:t>Vierte Ebene</a:t>
             </a:r>
           </a:p>
           <a:p>
             <a:pPr lvl="4"/>
             <a:r>
-              <a:rPr lang="de-DE" smtClean="0"/>
+              <a:rPr lang="de-DE"/>
               <a:t>Fünfte Ebene</a:t>
             </a:r>
-            <a:endParaRPr lang="de-DE"/>
           </a:p>
         </p:txBody>
       </p:sp>
@@ -1187,38 +1181,37 @@
           <a:p>
             <a:pPr lvl="0"/>
             <a:r>
-              <a:rPr lang="de-DE" smtClean="0"/>
+              <a:rPr lang="de-DE"/>
               <a:t>Formatvorlagen des Textmasters bearbeiten</a:t>
             </a:r>
           </a:p>
           <a:p>
             <a:pPr lvl="1"/>
             <a:r>
-              <a:rPr lang="de-DE" smtClean="0"/>
+              <a:rPr lang="de-DE"/>
               <a:t>Zweite Ebene</a:t>
             </a:r>
           </a:p>
           <a:p>
             <a:pPr lvl="2"/>
             <a:r>
-              <a:rPr lang="de-DE" smtClean="0"/>
+              <a:rPr lang="de-DE"/>
               <a:t>Dritte Ebene</a:t>
             </a:r>
           </a:p>
           <a:p>
             <a:pPr lvl="3"/>
             <a:r>
-              <a:rPr lang="de-DE" smtClean="0"/>
+              <a:rPr lang="de-DE"/>
               <a:t>Vierte Ebene</a:t>
             </a:r>
           </a:p>
           <a:p>
             <a:pPr lvl="4"/>
             <a:r>
-              <a:rPr lang="de-DE" smtClean="0"/>
+              <a:rPr lang="de-DE"/>
               <a:t>Fünfte Ebene</a:t>
             </a:r>
-            <a:endParaRPr lang="de-DE"/>
           </a:p>
         </p:txBody>
       </p:sp>
@@ -1239,7 +1232,7 @@
           <a:p>
             <a:fld id="{9E55EBDA-1967-4094-9A77-3961DCE060C3}" type="datetimeFigureOut">
               <a:rPr lang="de-DE" smtClean="0"/>
-              <a:t>18.06.2016</a:t>
+              <a:t>30.07.2016</a:t>
             </a:fld>
             <a:endParaRPr lang="de-DE"/>
           </a:p>
@@ -1338,10 +1331,9 @@
           <a:lstStyle/>
           <a:p>
             <a:r>
-              <a:rPr lang="de-DE" smtClean="0"/>
+              <a:rPr lang="de-DE"/>
               <a:t>Titelmasterformat durch Klicken bearbeiten</a:t>
             </a:r>
-            <a:endParaRPr lang="de-DE"/>
           </a:p>
         </p:txBody>
       </p:sp>
@@ -1404,7 +1396,7 @@
           <a:p>
             <a:pPr lvl="0"/>
             <a:r>
-              <a:rPr lang="de-DE" smtClean="0"/>
+              <a:rPr lang="de-DE"/>
               <a:t>Formatvorlagen des Textmasters bearbeiten</a:t>
             </a:r>
           </a:p>
@@ -1432,38 +1424,37 @@
           <a:p>
             <a:pPr lvl="0"/>
             <a:r>
-              <a:rPr lang="de-DE" smtClean="0"/>
+              <a:rPr lang="de-DE"/>
               <a:t>Formatvorlagen des Textmasters bearbeiten</a:t>
             </a:r>
           </a:p>
           <a:p>
             <a:pPr lvl="1"/>
             <a:r>
-              <a:rPr lang="de-DE" smtClean="0"/>
+              <a:rPr lang="de-DE"/>
               <a:t>Zweite Ebene</a:t>
             </a:r>
           </a:p>
           <a:p>
             <a:pPr lvl="2"/>
             <a:r>
-              <a:rPr lang="de-DE" smtClean="0"/>
+              <a:rPr lang="de-DE"/>
               <a:t>Dritte Ebene</a:t>
             </a:r>
           </a:p>
           <a:p>
             <a:pPr lvl="3"/>
             <a:r>
-              <a:rPr lang="de-DE" smtClean="0"/>
+              <a:rPr lang="de-DE"/>
               <a:t>Vierte Ebene</a:t>
             </a:r>
           </a:p>
           <a:p>
             <a:pPr lvl="4"/>
             <a:r>
-              <a:rPr lang="de-DE" smtClean="0"/>
+              <a:rPr lang="de-DE"/>
               <a:t>Fünfte Ebene</a:t>
             </a:r>
-            <a:endParaRPr lang="de-DE"/>
           </a:p>
         </p:txBody>
       </p:sp>
@@ -1526,7 +1517,7 @@
           <a:p>
             <a:pPr lvl="0"/>
             <a:r>
-              <a:rPr lang="de-DE" smtClean="0"/>
+              <a:rPr lang="de-DE"/>
               <a:t>Formatvorlagen des Textmasters bearbeiten</a:t>
             </a:r>
           </a:p>
@@ -1554,38 +1545,37 @@
           <a:p>
             <a:pPr lvl="0"/>
             <a:r>
-              <a:rPr lang="de-DE" smtClean="0"/>
+              <a:rPr lang="de-DE"/>
               <a:t>Formatvorlagen des Textmasters bearbeiten</a:t>
             </a:r>
           </a:p>
           <a:p>
             <a:pPr lvl="1"/>
             <a:r>
-              <a:rPr lang="de-DE" smtClean="0"/>
+              <a:rPr lang="de-DE"/>
               <a:t>Zweite Ebene</a:t>
             </a:r>
           </a:p>
           <a:p>
             <a:pPr lvl="2"/>
             <a:r>
-              <a:rPr lang="de-DE" smtClean="0"/>
+              <a:rPr lang="de-DE"/>
               <a:t>Dritte Ebene</a:t>
             </a:r>
           </a:p>
           <a:p>
             <a:pPr lvl="3"/>
             <a:r>
-              <a:rPr lang="de-DE" smtClean="0"/>
+              <a:rPr lang="de-DE"/>
               <a:t>Vierte Ebene</a:t>
             </a:r>
           </a:p>
           <a:p>
             <a:pPr lvl="4"/>
             <a:r>
-              <a:rPr lang="de-DE" smtClean="0"/>
+              <a:rPr lang="de-DE"/>
               <a:t>Fünfte Ebene</a:t>
             </a:r>
-            <a:endParaRPr lang="de-DE"/>
           </a:p>
         </p:txBody>
       </p:sp>
@@ -1606,7 +1596,7 @@
           <a:p>
             <a:fld id="{9E55EBDA-1967-4094-9A77-3961DCE060C3}" type="datetimeFigureOut">
               <a:rPr lang="de-DE" smtClean="0"/>
-              <a:t>18.06.2016</a:t>
+              <a:t>30.07.2016</a:t>
             </a:fld>
             <a:endParaRPr lang="de-DE"/>
           </a:p>
@@ -1700,10 +1690,9 @@
           <a:lstStyle/>
           <a:p>
             <a:r>
-              <a:rPr lang="de-DE" smtClean="0"/>
+              <a:rPr lang="de-DE"/>
               <a:t>Titelmasterformat durch Klicken bearbeiten</a:t>
             </a:r>
-            <a:endParaRPr lang="de-DE"/>
           </a:p>
         </p:txBody>
       </p:sp>
@@ -1724,7 +1713,7 @@
           <a:p>
             <a:fld id="{9E55EBDA-1967-4094-9A77-3961DCE060C3}" type="datetimeFigureOut">
               <a:rPr lang="de-DE" smtClean="0"/>
-              <a:t>18.06.2016</a:t>
+              <a:t>30.07.2016</a:t>
             </a:fld>
             <a:endParaRPr lang="de-DE"/>
           </a:p>
@@ -1819,7 +1808,7 @@
           <a:p>
             <a:fld id="{9E55EBDA-1967-4094-9A77-3961DCE060C3}" type="datetimeFigureOut">
               <a:rPr lang="de-DE" smtClean="0"/>
-              <a:t>18.06.2016</a:t>
+              <a:t>30.07.2016</a:t>
             </a:fld>
             <a:endParaRPr lang="de-DE"/>
           </a:p>
@@ -1922,10 +1911,9 @@
           </a:lstStyle>
           <a:p>
             <a:r>
-              <a:rPr lang="de-DE" smtClean="0"/>
+              <a:rPr lang="de-DE"/>
               <a:t>Titelmasterformat durch Klicken bearbeiten</a:t>
             </a:r>
-            <a:endParaRPr lang="de-DE"/>
           </a:p>
         </p:txBody>
       </p:sp>
@@ -1979,38 +1967,37 @@
           <a:p>
             <a:pPr lvl="0"/>
             <a:r>
-              <a:rPr lang="de-DE" smtClean="0"/>
+              <a:rPr lang="de-DE"/>
               <a:t>Formatvorlagen des Textmasters bearbeiten</a:t>
             </a:r>
           </a:p>
           <a:p>
             <a:pPr lvl="1"/>
             <a:r>
-              <a:rPr lang="de-DE" smtClean="0"/>
+              <a:rPr lang="de-DE"/>
               <a:t>Zweite Ebene</a:t>
             </a:r>
           </a:p>
           <a:p>
             <a:pPr lvl="2"/>
             <a:r>
-              <a:rPr lang="de-DE" smtClean="0"/>
+              <a:rPr lang="de-DE"/>
               <a:t>Dritte Ebene</a:t>
             </a:r>
           </a:p>
           <a:p>
             <a:pPr lvl="3"/>
             <a:r>
-              <a:rPr lang="de-DE" smtClean="0"/>
+              <a:rPr lang="de-DE"/>
               <a:t>Vierte Ebene</a:t>
             </a:r>
           </a:p>
           <a:p>
             <a:pPr lvl="4"/>
             <a:r>
-              <a:rPr lang="de-DE" smtClean="0"/>
+              <a:rPr lang="de-DE"/>
               <a:t>Fünfte Ebene</a:t>
             </a:r>
-            <a:endParaRPr lang="de-DE"/>
           </a:p>
         </p:txBody>
       </p:sp>
@@ -2073,7 +2060,7 @@
           <a:p>
             <a:pPr lvl="0"/>
             <a:r>
-              <a:rPr lang="de-DE" smtClean="0"/>
+              <a:rPr lang="de-DE"/>
               <a:t>Formatvorlagen des Textmasters bearbeiten</a:t>
             </a:r>
           </a:p>
@@ -2096,7 +2083,7 @@
           <a:p>
             <a:fld id="{9E55EBDA-1967-4094-9A77-3961DCE060C3}" type="datetimeFigureOut">
               <a:rPr lang="de-DE" smtClean="0"/>
-              <a:t>18.06.2016</a:t>
+              <a:t>30.07.2016</a:t>
             </a:fld>
             <a:endParaRPr lang="de-DE"/>
           </a:p>
@@ -2199,10 +2186,9 @@
           </a:lstStyle>
           <a:p>
             <a:r>
-              <a:rPr lang="de-DE" smtClean="0"/>
+              <a:rPr lang="de-DE"/>
               <a:t>Titelmasterformat durch Klicken bearbeiten</a:t>
             </a:r>
-            <a:endParaRPr lang="de-DE"/>
           </a:p>
         </p:txBody>
       </p:sp>
@@ -2326,7 +2312,7 @@
           <a:p>
             <a:pPr lvl="0"/>
             <a:r>
-              <a:rPr lang="de-DE" smtClean="0"/>
+              <a:rPr lang="de-DE"/>
               <a:t>Formatvorlagen des Textmasters bearbeiten</a:t>
             </a:r>
           </a:p>
@@ -2349,7 +2335,7 @@
           <a:p>
             <a:fld id="{9E55EBDA-1967-4094-9A77-3961DCE060C3}" type="datetimeFigureOut">
               <a:rPr lang="de-DE" smtClean="0"/>
-              <a:t>18.06.2016</a:t>
+              <a:t>30.07.2016</a:t>
             </a:fld>
             <a:endParaRPr lang="de-DE"/>
           </a:p>
@@ -2458,10 +2444,9 @@
           <a:lstStyle/>
           <a:p>
             <a:r>
-              <a:rPr lang="de-DE" smtClean="0"/>
+              <a:rPr lang="de-DE"/>
               <a:t>Titelmasterformat durch Klicken bearbeiten</a:t>
             </a:r>
-            <a:endParaRPr lang="de-DE"/>
           </a:p>
         </p:txBody>
       </p:sp>
@@ -2492,38 +2477,37 @@
           <a:p>
             <a:pPr lvl="0"/>
             <a:r>
-              <a:rPr lang="de-DE" smtClean="0"/>
+              <a:rPr lang="de-DE"/>
               <a:t>Formatvorlagen des Textmasters bearbeiten</a:t>
             </a:r>
           </a:p>
           <a:p>
             <a:pPr lvl="1"/>
             <a:r>
-              <a:rPr lang="de-DE" smtClean="0"/>
+              <a:rPr lang="de-DE"/>
               <a:t>Zweite Ebene</a:t>
             </a:r>
           </a:p>
           <a:p>
             <a:pPr lvl="2"/>
             <a:r>
-              <a:rPr lang="de-DE" smtClean="0"/>
+              <a:rPr lang="de-DE"/>
               <a:t>Dritte Ebene</a:t>
             </a:r>
           </a:p>
           <a:p>
             <a:pPr lvl="3"/>
             <a:r>
-              <a:rPr lang="de-DE" smtClean="0"/>
+              <a:rPr lang="de-DE"/>
               <a:t>Vierte Ebene</a:t>
             </a:r>
           </a:p>
           <a:p>
             <a:pPr lvl="4"/>
             <a:r>
-              <a:rPr lang="de-DE" smtClean="0"/>
+              <a:rPr lang="de-DE"/>
               <a:t>Fünfte Ebene</a:t>
             </a:r>
-            <a:endParaRPr lang="de-DE"/>
           </a:p>
         </p:txBody>
       </p:sp>
@@ -2562,7 +2546,7 @@
           <a:p>
             <a:fld id="{9E55EBDA-1967-4094-9A77-3961DCE060C3}" type="datetimeFigureOut">
               <a:rPr lang="de-DE" smtClean="0"/>
-              <a:t>18.06.2016</a:t>
+              <a:t>30.07.2016</a:t>
             </a:fld>
             <a:endParaRPr lang="de-DE"/>
           </a:p>
@@ -2990,19 +2974,19 @@
           <a:lstStyle/>
           <a:p>
             <a:r>
-              <a:rPr lang="de-DE" sz="2800" dirty="0" smtClean="0"/>
+              <a:rPr lang="de-DE" sz="2800" dirty="0"/>
               <a:t>Temperaturverteilung an den Ausgängen eines </a:t>
             </a:r>
             <a:r>
-              <a:rPr lang="de-DE" sz="2800" dirty="0" err="1" smtClean="0"/>
+              <a:rPr lang="de-DE" sz="2800" dirty="0" err="1"/>
               <a:t>Crossflow</a:t>
             </a:r>
             <a:r>
-              <a:rPr lang="de-DE" sz="2800" dirty="0" smtClean="0"/>
+              <a:rPr lang="de-DE" sz="2800" dirty="0"/>
               <a:t> </a:t>
             </a:r>
             <a:r>
-              <a:rPr lang="de-DE" sz="2800" dirty="0" err="1" smtClean="0"/>
+              <a:rPr lang="de-DE" sz="2800" dirty="0" err="1"/>
               <a:t>Enthalpieübertragers</a:t>
             </a:r>
             <a:endParaRPr lang="de-DE" sz="2800" dirty="0"/>
@@ -3155,130 +3139,129 @@
           <a:lstStyle/>
           <a:p>
             <a:r>
-              <a:rPr lang="de-DE" sz="800" dirty="0" smtClean="0"/>
+              <a:rPr lang="de-DE" sz="800" dirty="0"/>
               <a:t>Quelle: Analysis </a:t>
             </a:r>
             <a:r>
-              <a:rPr lang="de-DE" sz="800" dirty="0" err="1" smtClean="0"/>
+              <a:rPr lang="de-DE" sz="800" dirty="0" err="1"/>
               <a:t>of</a:t>
             </a:r>
             <a:r>
-              <a:rPr lang="de-DE" sz="800" dirty="0" smtClean="0"/>
+              <a:rPr lang="de-DE" sz="800" dirty="0"/>
               <a:t> a </a:t>
             </a:r>
             <a:r>
-              <a:rPr lang="de-DE" sz="800" dirty="0" err="1" smtClean="0"/>
+              <a:rPr lang="de-DE" sz="800" dirty="0" err="1"/>
               <a:t>membrane</a:t>
             </a:r>
             <a:r>
-              <a:rPr lang="de-DE" sz="800" dirty="0" smtClean="0"/>
+              <a:rPr lang="de-DE" sz="800" dirty="0"/>
               <a:t> </a:t>
             </a:r>
             <a:r>
-              <a:rPr lang="de-DE" sz="800" dirty="0" err="1" smtClean="0"/>
+              <a:rPr lang="de-DE" sz="800" dirty="0" err="1"/>
               <a:t>based</a:t>
             </a:r>
             <a:r>
-              <a:rPr lang="de-DE" sz="800" dirty="0" smtClean="0"/>
+              <a:rPr lang="de-DE" sz="800" dirty="0"/>
               <a:t> </a:t>
             </a:r>
             <a:r>
-              <a:rPr lang="de-DE" sz="800" dirty="0" err="1" smtClean="0"/>
+              <a:rPr lang="de-DE" sz="800" dirty="0" err="1"/>
               <a:t>air-dehumidification</a:t>
             </a:r>
             <a:r>
-              <a:rPr lang="de-DE" sz="800" dirty="0" smtClean="0"/>
+              <a:rPr lang="de-DE" sz="800" dirty="0"/>
               <a:t> </a:t>
             </a:r>
             <a:r>
-              <a:rPr lang="de-DE" sz="800" dirty="0" err="1" smtClean="0"/>
+              <a:rPr lang="de-DE" sz="800" dirty="0" err="1"/>
               <a:t>unit</a:t>
             </a:r>
             <a:r>
-              <a:rPr lang="de-DE" sz="800" dirty="0" smtClean="0"/>
+              <a:rPr lang="de-DE" sz="800" dirty="0"/>
               <a:t> </a:t>
             </a:r>
             <a:r>
-              <a:rPr lang="de-DE" sz="800" dirty="0" err="1" smtClean="0"/>
+              <a:rPr lang="de-DE" sz="800" dirty="0" err="1"/>
               <a:t>for</a:t>
             </a:r>
             <a:r>
-              <a:rPr lang="de-DE" sz="800" dirty="0" smtClean="0"/>
+              <a:rPr lang="de-DE" sz="800" dirty="0"/>
               <a:t> </a:t>
             </a:r>
             <a:r>
-              <a:rPr lang="de-DE" sz="800" dirty="0" err="1" smtClean="0"/>
+              <a:rPr lang="de-DE" sz="800" dirty="0" err="1"/>
               <a:t>air</a:t>
             </a:r>
             <a:r>
-              <a:rPr lang="de-DE" sz="800" dirty="0" smtClean="0"/>
+              <a:rPr lang="de-DE" sz="800" dirty="0"/>
               <a:t> </a:t>
             </a:r>
             <a:r>
-              <a:rPr lang="de-DE" sz="800" dirty="0" err="1" smtClean="0"/>
+              <a:rPr lang="de-DE" sz="800" dirty="0" err="1"/>
               <a:t>conditioning</a:t>
             </a:r>
             <a:r>
-              <a:rPr lang="de-DE" sz="800" dirty="0" smtClean="0"/>
+              <a:rPr lang="de-DE" sz="800" dirty="0"/>
               <a:t> in  </a:t>
             </a:r>
             <a:r>
-              <a:rPr lang="de-DE" sz="800" dirty="0" err="1" smtClean="0"/>
+              <a:rPr lang="de-DE" sz="800" dirty="0" err="1"/>
               <a:t>tropical</a:t>
             </a:r>
             <a:r>
-              <a:rPr lang="de-DE" sz="800" dirty="0" smtClean="0"/>
+              <a:rPr lang="de-DE" sz="800" dirty="0"/>
               <a:t> </a:t>
             </a:r>
             <a:r>
-              <a:rPr lang="de-DE" sz="800" dirty="0" err="1" smtClean="0"/>
+              <a:rPr lang="de-DE" sz="800" dirty="0" err="1"/>
               <a:t>climates</a:t>
             </a:r>
             <a:r>
-              <a:rPr lang="de-DE" sz="800" dirty="0" smtClean="0"/>
+              <a:rPr lang="de-DE" sz="800" dirty="0"/>
               <a:t>, </a:t>
             </a:r>
             <a:r>
-              <a:rPr lang="de-DE" sz="800" dirty="0" err="1" smtClean="0"/>
+              <a:rPr lang="de-DE" sz="800" dirty="0" err="1"/>
               <a:t>Khin</a:t>
             </a:r>
             <a:r>
-              <a:rPr lang="de-DE" sz="800" dirty="0" smtClean="0"/>
+              <a:rPr lang="de-DE" sz="800" dirty="0"/>
               <a:t> ZAW, M. Reza </a:t>
             </a:r>
             <a:r>
-              <a:rPr lang="de-DE" sz="800" dirty="0" err="1" smtClean="0"/>
+              <a:rPr lang="de-DE" sz="800" dirty="0" err="1"/>
               <a:t>Safizadeh</a:t>
             </a:r>
             <a:r>
-              <a:rPr lang="de-DE" sz="800" dirty="0" smtClean="0"/>
+              <a:rPr lang="de-DE" sz="800" dirty="0"/>
               <a:t>, Joachim Luther, Kim </a:t>
             </a:r>
             <a:r>
-              <a:rPr lang="de-DE" sz="800" dirty="0" err="1" smtClean="0"/>
+              <a:rPr lang="de-DE" sz="800" dirty="0" err="1"/>
               <a:t>Choon</a:t>
             </a:r>
             <a:r>
-              <a:rPr lang="de-DE" sz="800" dirty="0" smtClean="0"/>
+              <a:rPr lang="de-DE" sz="800" dirty="0"/>
               <a:t> </a:t>
             </a:r>
             <a:r>
-              <a:rPr lang="de-DE" sz="800" dirty="0" err="1" smtClean="0"/>
+              <a:rPr lang="de-DE" sz="800" dirty="0" err="1"/>
               <a:t>Ng</a:t>
             </a:r>
             <a:r>
-              <a:rPr lang="de-DE" sz="800" dirty="0" smtClean="0"/>
+              <a:rPr lang="de-DE" sz="800" dirty="0"/>
               <a:t>, Applied Thermal </a:t>
             </a:r>
             <a:r>
-              <a:rPr lang="de-DE" sz="800" dirty="0" err="1" smtClean="0"/>
+              <a:rPr lang="de-DE" sz="800" dirty="0" err="1"/>
               <a:t>Enginieering</a:t>
             </a:r>
             <a:r>
-              <a:rPr lang="de-DE" sz="800" dirty="0" smtClean="0"/>
+              <a:rPr lang="de-DE" sz="800" dirty="0"/>
               <a:t> </a:t>
             </a:r>
-            <a:endParaRPr lang="de-DE" sz="800" dirty="0"/>
           </a:p>
         </p:txBody>
       </p:sp>
@@ -3474,262 +3457,262 @@
           <a:lstStyle/>
           <a:p>
             <a:r>
-              <a:rPr lang="de-DE" dirty="0" smtClean="0"/>
+              <a:rPr lang="de-DE" dirty="0"/>
               <a:t>Literatur:</a:t>
             </a:r>
           </a:p>
           <a:p>
             <a:pPr lvl="1"/>
             <a:r>
-              <a:rPr lang="de-DE" dirty="0" smtClean="0"/>
+              <a:rPr lang="de-DE" dirty="0"/>
               <a:t>Analysis </a:t>
             </a:r>
             <a:r>
-              <a:rPr lang="de-DE" dirty="0" err="1" smtClean="0"/>
+              <a:rPr lang="de-DE" dirty="0" err="1"/>
               <a:t>of</a:t>
             </a:r>
             <a:r>
-              <a:rPr lang="de-DE" dirty="0" smtClean="0"/>
+              <a:rPr lang="de-DE" dirty="0"/>
               <a:t> a </a:t>
             </a:r>
             <a:r>
-              <a:rPr lang="de-DE" dirty="0" err="1" smtClean="0"/>
+              <a:rPr lang="de-DE" dirty="0" err="1"/>
               <a:t>membrane</a:t>
             </a:r>
             <a:r>
-              <a:rPr lang="de-DE" dirty="0" smtClean="0"/>
+              <a:rPr lang="de-DE" dirty="0"/>
               <a:t> </a:t>
             </a:r>
             <a:r>
-              <a:rPr lang="de-DE" dirty="0" err="1" smtClean="0"/>
+              <a:rPr lang="de-DE" dirty="0" err="1"/>
               <a:t>based</a:t>
             </a:r>
             <a:r>
-              <a:rPr lang="de-DE" dirty="0" smtClean="0"/>
+              <a:rPr lang="de-DE" dirty="0"/>
               <a:t> </a:t>
             </a:r>
             <a:r>
-              <a:rPr lang="de-DE" dirty="0" err="1" smtClean="0"/>
+              <a:rPr lang="de-DE" dirty="0" err="1"/>
               <a:t>air-dehumidification</a:t>
             </a:r>
             <a:r>
-              <a:rPr lang="de-DE" dirty="0" smtClean="0"/>
+              <a:rPr lang="de-DE" dirty="0"/>
               <a:t> </a:t>
             </a:r>
             <a:r>
-              <a:rPr lang="de-DE" dirty="0" err="1" smtClean="0"/>
+              <a:rPr lang="de-DE" dirty="0" err="1"/>
               <a:t>unit</a:t>
             </a:r>
             <a:r>
-              <a:rPr lang="de-DE" dirty="0" smtClean="0"/>
+              <a:rPr lang="de-DE" dirty="0"/>
               <a:t> </a:t>
             </a:r>
             <a:r>
-              <a:rPr lang="de-DE" dirty="0" err="1" smtClean="0"/>
+              <a:rPr lang="de-DE" dirty="0" err="1"/>
               <a:t>for</a:t>
             </a:r>
             <a:r>
-              <a:rPr lang="de-DE" dirty="0" smtClean="0"/>
+              <a:rPr lang="de-DE" dirty="0"/>
               <a:t> </a:t>
             </a:r>
             <a:r>
-              <a:rPr lang="de-DE" dirty="0" err="1" smtClean="0"/>
+              <a:rPr lang="de-DE" dirty="0" err="1"/>
               <a:t>air</a:t>
             </a:r>
             <a:r>
-              <a:rPr lang="de-DE" dirty="0" smtClean="0"/>
+              <a:rPr lang="de-DE" dirty="0"/>
               <a:t> </a:t>
             </a:r>
             <a:r>
-              <a:rPr lang="de-DE" dirty="0" err="1" smtClean="0"/>
+              <a:rPr lang="de-DE" dirty="0" err="1"/>
               <a:t>conditioning</a:t>
             </a:r>
             <a:r>
-              <a:rPr lang="de-DE" dirty="0" smtClean="0"/>
+              <a:rPr lang="de-DE" dirty="0"/>
               <a:t> in </a:t>
             </a:r>
             <a:r>
-              <a:rPr lang="de-DE" dirty="0" err="1" smtClean="0"/>
+              <a:rPr lang="de-DE" dirty="0" err="1"/>
               <a:t>tropical</a:t>
             </a:r>
             <a:r>
-              <a:rPr lang="de-DE" dirty="0" smtClean="0"/>
+              <a:rPr lang="de-DE" dirty="0"/>
               <a:t> </a:t>
             </a:r>
             <a:r>
-              <a:rPr lang="de-DE" dirty="0" err="1" smtClean="0"/>
+              <a:rPr lang="de-DE" dirty="0" err="1"/>
               <a:t>climates</a:t>
             </a:r>
-            <a:endParaRPr lang="de-DE" dirty="0" smtClean="0"/>
+            <a:endParaRPr lang="de-DE" dirty="0"/>
           </a:p>
           <a:p>
             <a:pPr lvl="1"/>
             <a:r>
-              <a:rPr lang="de-DE" dirty="0" smtClean="0"/>
+              <a:rPr lang="de-DE" dirty="0"/>
               <a:t>Cross-</a:t>
             </a:r>
             <a:r>
-              <a:rPr lang="de-DE" dirty="0" err="1" smtClean="0"/>
+              <a:rPr lang="de-DE" dirty="0" err="1"/>
               <a:t>flow</a:t>
             </a:r>
             <a:r>
-              <a:rPr lang="de-DE" dirty="0" smtClean="0"/>
+              <a:rPr lang="de-DE" dirty="0"/>
               <a:t> </a:t>
             </a:r>
             <a:r>
-              <a:rPr lang="de-DE" dirty="0" err="1" smtClean="0"/>
+              <a:rPr lang="de-DE" dirty="0" err="1"/>
               <a:t>membrane-based</a:t>
             </a:r>
             <a:r>
-              <a:rPr lang="de-DE" dirty="0" smtClean="0"/>
+              <a:rPr lang="de-DE" dirty="0"/>
               <a:t> </a:t>
             </a:r>
             <a:r>
-              <a:rPr lang="de-DE" dirty="0" err="1" smtClean="0"/>
+              <a:rPr lang="de-DE" dirty="0" err="1"/>
               <a:t>enthalpy</a:t>
             </a:r>
             <a:r>
-              <a:rPr lang="de-DE" dirty="0" smtClean="0"/>
+              <a:rPr lang="de-DE" dirty="0"/>
               <a:t> </a:t>
             </a:r>
             <a:r>
-              <a:rPr lang="de-DE" dirty="0" err="1" smtClean="0"/>
+              <a:rPr lang="de-DE" dirty="0" err="1"/>
               <a:t>exchanger</a:t>
             </a:r>
             <a:r>
-              <a:rPr lang="de-DE" dirty="0" smtClean="0"/>
+              <a:rPr lang="de-DE" dirty="0"/>
               <a:t> </a:t>
             </a:r>
             <a:r>
-              <a:rPr lang="de-DE" dirty="0" err="1" smtClean="0"/>
+              <a:rPr lang="de-DE" dirty="0" err="1"/>
               <a:t>balanced</a:t>
             </a:r>
             <a:r>
-              <a:rPr lang="de-DE" dirty="0" smtClean="0"/>
+              <a:rPr lang="de-DE" dirty="0"/>
               <a:t> </a:t>
             </a:r>
             <a:r>
-              <a:rPr lang="de-DE" dirty="0" err="1" smtClean="0"/>
+              <a:rPr lang="de-DE" dirty="0" err="1"/>
               <a:t>and</a:t>
             </a:r>
             <a:r>
-              <a:rPr lang="de-DE" dirty="0" smtClean="0"/>
+              <a:rPr lang="de-DE" dirty="0"/>
               <a:t> </a:t>
             </a:r>
             <a:r>
-              <a:rPr lang="de-DE" dirty="0" err="1" smtClean="0"/>
+              <a:rPr lang="de-DE" dirty="0" err="1"/>
               <a:t>unbalanced</a:t>
             </a:r>
             <a:r>
-              <a:rPr lang="de-DE" dirty="0" smtClean="0"/>
+              <a:rPr lang="de-DE" dirty="0"/>
               <a:t> </a:t>
             </a:r>
             <a:r>
-              <a:rPr lang="de-DE" dirty="0" err="1" smtClean="0"/>
+              <a:rPr lang="de-DE" dirty="0" err="1"/>
               <a:t>flow</a:t>
             </a:r>
-            <a:endParaRPr lang="de-DE" dirty="0" smtClean="0"/>
+            <a:endParaRPr lang="de-DE" dirty="0"/>
           </a:p>
           <a:p>
             <a:pPr lvl="1"/>
             <a:r>
-              <a:rPr lang="de-DE" dirty="0" err="1" smtClean="0"/>
+              <a:rPr lang="de-DE" dirty="0" err="1"/>
               <a:t>Heat</a:t>
             </a:r>
             <a:r>
-              <a:rPr lang="de-DE" dirty="0" smtClean="0"/>
+              <a:rPr lang="de-DE" dirty="0"/>
               <a:t> </a:t>
             </a:r>
             <a:r>
-              <a:rPr lang="de-DE" dirty="0" err="1" smtClean="0"/>
+              <a:rPr lang="de-DE" dirty="0" err="1"/>
               <a:t>and</a:t>
             </a:r>
             <a:r>
-              <a:rPr lang="de-DE" dirty="0" smtClean="0"/>
+              <a:rPr lang="de-DE" dirty="0"/>
               <a:t> </a:t>
             </a:r>
             <a:r>
-              <a:rPr lang="de-DE" dirty="0" err="1" smtClean="0"/>
+              <a:rPr lang="de-DE" dirty="0" err="1"/>
               <a:t>moisture</a:t>
             </a:r>
             <a:r>
-              <a:rPr lang="de-DE" dirty="0" smtClean="0"/>
+              <a:rPr lang="de-DE" dirty="0"/>
               <a:t> </a:t>
             </a:r>
             <a:r>
-              <a:rPr lang="de-DE" dirty="0" err="1" smtClean="0"/>
+              <a:rPr lang="de-DE" dirty="0" err="1"/>
               <a:t>transfer</a:t>
             </a:r>
             <a:r>
-              <a:rPr lang="de-DE" dirty="0" smtClean="0"/>
+              <a:rPr lang="de-DE" dirty="0"/>
               <a:t> in </a:t>
             </a:r>
             <a:r>
-              <a:rPr lang="de-DE" dirty="0" err="1" smtClean="0"/>
+              <a:rPr lang="de-DE" dirty="0" err="1"/>
               <a:t>application</a:t>
             </a:r>
             <a:r>
-              <a:rPr lang="de-DE" dirty="0" smtClean="0"/>
+              <a:rPr lang="de-DE" dirty="0"/>
               <a:t> </a:t>
             </a:r>
             <a:r>
-              <a:rPr lang="de-DE" dirty="0" err="1" smtClean="0"/>
+              <a:rPr lang="de-DE" dirty="0" err="1"/>
               <a:t>scale</a:t>
             </a:r>
             <a:r>
-              <a:rPr lang="de-DE" dirty="0" smtClean="0"/>
+              <a:rPr lang="de-DE" dirty="0"/>
               <a:t> parallel-</a:t>
             </a:r>
             <a:r>
-              <a:rPr lang="de-DE" dirty="0" err="1" smtClean="0"/>
+              <a:rPr lang="de-DE" dirty="0" err="1"/>
               <a:t>plates</a:t>
             </a:r>
             <a:r>
-              <a:rPr lang="de-DE" dirty="0" smtClean="0"/>
+              <a:rPr lang="de-DE" dirty="0"/>
               <a:t> </a:t>
             </a:r>
             <a:r>
-              <a:rPr lang="de-DE" dirty="0" err="1" smtClean="0"/>
+              <a:rPr lang="de-DE" dirty="0" err="1"/>
               <a:t>enthalpy</a:t>
             </a:r>
             <a:r>
-              <a:rPr lang="de-DE" dirty="0" smtClean="0"/>
+              <a:rPr lang="de-DE" dirty="0"/>
               <a:t> </a:t>
             </a:r>
             <a:r>
-              <a:rPr lang="de-DE" dirty="0" err="1" smtClean="0"/>
+              <a:rPr lang="de-DE" dirty="0" err="1"/>
               <a:t>exchangers</a:t>
             </a:r>
             <a:r>
-              <a:rPr lang="de-DE" dirty="0" smtClean="0"/>
+              <a:rPr lang="de-DE" dirty="0"/>
               <a:t> </a:t>
             </a:r>
             <a:r>
-              <a:rPr lang="de-DE" dirty="0" err="1" smtClean="0"/>
+              <a:rPr lang="de-DE" dirty="0" err="1"/>
               <a:t>with</a:t>
             </a:r>
             <a:r>
-              <a:rPr lang="de-DE" dirty="0" smtClean="0"/>
+              <a:rPr lang="de-DE" dirty="0"/>
               <a:t> </a:t>
             </a:r>
             <a:r>
-              <a:rPr lang="de-DE" dirty="0" err="1" smtClean="0"/>
+              <a:rPr lang="de-DE" dirty="0" err="1"/>
               <a:t>novel</a:t>
             </a:r>
             <a:r>
-              <a:rPr lang="de-DE" dirty="0" smtClean="0"/>
+              <a:rPr lang="de-DE" dirty="0"/>
               <a:t> </a:t>
             </a:r>
             <a:r>
-              <a:rPr lang="de-DE" dirty="0" err="1" smtClean="0"/>
+              <a:rPr lang="de-DE" dirty="0" err="1"/>
               <a:t>membrane</a:t>
             </a:r>
             <a:r>
-              <a:rPr lang="de-DE" dirty="0" smtClean="0"/>
+              <a:rPr lang="de-DE" dirty="0"/>
               <a:t> </a:t>
             </a:r>
             <a:r>
-              <a:rPr lang="de-DE" dirty="0" err="1" smtClean="0"/>
+              <a:rPr lang="de-DE" dirty="0" err="1"/>
               <a:t>materials</a:t>
             </a:r>
             <a:endParaRPr lang="de-DE" dirty="0"/>
@@ -3766,249 +3749,6 @@
           <a:chExt cx="0" cy="0"/>
         </a:xfrm>
       </p:grpSpPr>
-      <p:sp>
-        <p:nvSpPr>
-          <p:cNvPr id="4" name="Rechteck 3"/>
-          <p:cNvSpPr/>
-          <p:nvPr/>
-        </p:nvSpPr>
-        <p:spPr>
-          <a:xfrm>
-            <a:off x="7378700" y="812800"/>
-            <a:ext cx="4343400" cy="1727200"/>
-          </a:xfrm>
-          <a:prstGeom prst="rect">
-            <a:avLst/>
-          </a:prstGeom>
-          <a:solidFill>
-            <a:schemeClr val="bg1"/>
-          </a:solidFill>
-        </p:spPr>
-        <p:style>
-          <a:lnRef idx="2">
-            <a:schemeClr val="accent1">
-              <a:shade val="50000"/>
-            </a:schemeClr>
-          </a:lnRef>
-          <a:fillRef idx="1">
-            <a:schemeClr val="accent1"/>
-          </a:fillRef>
-          <a:effectRef idx="0">
-            <a:schemeClr val="accent1"/>
-          </a:effectRef>
-          <a:fontRef idx="minor">
-            <a:schemeClr val="lt1"/>
-          </a:fontRef>
-        </p:style>
-        <p:txBody>
-          <a:bodyPr rtlCol="0" anchor="ctr"/>
-          <a:lstStyle/>
-          <a:p>
-            <a:pPr algn="ctr"/>
-            <a:endParaRPr lang="de-DE"/>
-          </a:p>
-        </p:txBody>
-      </p:sp>
-      <p:sp>
-        <p:nvSpPr>
-          <p:cNvPr id="5" name="Ellipse 4"/>
-          <p:cNvSpPr/>
-          <p:nvPr/>
-        </p:nvSpPr>
-        <p:spPr>
-          <a:xfrm>
-            <a:off x="9493250" y="914400"/>
-            <a:ext cx="114300" cy="127000"/>
-          </a:xfrm>
-          <a:prstGeom prst="ellipse">
-            <a:avLst/>
-          </a:prstGeom>
-        </p:spPr>
-        <p:style>
-          <a:lnRef idx="2">
-            <a:schemeClr val="accent1">
-              <a:shade val="50000"/>
-            </a:schemeClr>
-          </a:lnRef>
-          <a:fillRef idx="1">
-            <a:schemeClr val="accent1"/>
-          </a:fillRef>
-          <a:effectRef idx="0">
-            <a:schemeClr val="accent1"/>
-          </a:effectRef>
-          <a:fontRef idx="minor">
-            <a:schemeClr val="lt1"/>
-          </a:fontRef>
-        </p:style>
-        <p:txBody>
-          <a:bodyPr rtlCol="0" anchor="ctr"/>
-          <a:lstStyle/>
-          <a:p>
-            <a:pPr algn="ctr"/>
-            <a:endParaRPr lang="de-DE"/>
-          </a:p>
-        </p:txBody>
-      </p:sp>
-      <p:sp>
-        <p:nvSpPr>
-          <p:cNvPr id="6" name="Ellipse 5"/>
-          <p:cNvSpPr/>
-          <p:nvPr/>
-        </p:nvSpPr>
-        <p:spPr>
-          <a:xfrm>
-            <a:off x="9505950" y="2311400"/>
-            <a:ext cx="114300" cy="127000"/>
-          </a:xfrm>
-          <a:prstGeom prst="ellipse">
-            <a:avLst/>
-          </a:prstGeom>
-        </p:spPr>
-        <p:style>
-          <a:lnRef idx="2">
-            <a:schemeClr val="accent1">
-              <a:shade val="50000"/>
-            </a:schemeClr>
-          </a:lnRef>
-          <a:fillRef idx="1">
-            <a:schemeClr val="accent1"/>
-          </a:fillRef>
-          <a:effectRef idx="0">
-            <a:schemeClr val="accent1"/>
-          </a:effectRef>
-          <a:fontRef idx="minor">
-            <a:schemeClr val="lt1"/>
-          </a:fontRef>
-        </p:style>
-        <p:txBody>
-          <a:bodyPr rtlCol="0" anchor="ctr"/>
-          <a:lstStyle/>
-          <a:p>
-            <a:pPr algn="ctr"/>
-            <a:endParaRPr lang="de-DE"/>
-          </a:p>
-        </p:txBody>
-      </p:sp>
-      <p:sp>
-        <p:nvSpPr>
-          <p:cNvPr id="7" name="Ellipse 6"/>
-          <p:cNvSpPr/>
-          <p:nvPr/>
-        </p:nvSpPr>
-        <p:spPr>
-          <a:xfrm>
-            <a:off x="11366500" y="1612900"/>
-            <a:ext cx="114300" cy="127000"/>
-          </a:xfrm>
-          <a:prstGeom prst="ellipse">
-            <a:avLst/>
-          </a:prstGeom>
-        </p:spPr>
-        <p:style>
-          <a:lnRef idx="2">
-            <a:schemeClr val="accent1">
-              <a:shade val="50000"/>
-            </a:schemeClr>
-          </a:lnRef>
-          <a:fillRef idx="1">
-            <a:schemeClr val="accent1"/>
-          </a:fillRef>
-          <a:effectRef idx="0">
-            <a:schemeClr val="accent1"/>
-          </a:effectRef>
-          <a:fontRef idx="minor">
-            <a:schemeClr val="lt1"/>
-          </a:fontRef>
-        </p:style>
-        <p:txBody>
-          <a:bodyPr rtlCol="0" anchor="ctr"/>
-          <a:lstStyle/>
-          <a:p>
-            <a:pPr algn="ctr"/>
-            <a:endParaRPr lang="de-DE"/>
-          </a:p>
-        </p:txBody>
-      </p:sp>
-      <p:sp>
-        <p:nvSpPr>
-          <p:cNvPr id="8" name="Ellipse 7"/>
-          <p:cNvSpPr/>
-          <p:nvPr/>
-        </p:nvSpPr>
-        <p:spPr>
-          <a:xfrm>
-            <a:off x="7620000" y="1612900"/>
-            <a:ext cx="114300" cy="127000"/>
-          </a:xfrm>
-          <a:prstGeom prst="ellipse">
-            <a:avLst/>
-          </a:prstGeom>
-        </p:spPr>
-        <p:style>
-          <a:lnRef idx="2">
-            <a:schemeClr val="accent1">
-              <a:shade val="50000"/>
-            </a:schemeClr>
-          </a:lnRef>
-          <a:fillRef idx="1">
-            <a:schemeClr val="accent1"/>
-          </a:fillRef>
-          <a:effectRef idx="0">
-            <a:schemeClr val="accent1"/>
-          </a:effectRef>
-          <a:fontRef idx="minor">
-            <a:schemeClr val="lt1"/>
-          </a:fontRef>
-        </p:style>
-        <p:txBody>
-          <a:bodyPr rtlCol="0" anchor="ctr"/>
-          <a:lstStyle/>
-          <a:p>
-            <a:pPr algn="ctr"/>
-            <a:endParaRPr lang="de-DE"/>
-          </a:p>
-        </p:txBody>
-      </p:sp>
-      <p:sp>
-        <p:nvSpPr>
-          <p:cNvPr id="9" name="Ellipse 8"/>
-          <p:cNvSpPr/>
-          <p:nvPr/>
-        </p:nvSpPr>
-        <p:spPr>
-          <a:xfrm>
-            <a:off x="9493250" y="1612900"/>
-            <a:ext cx="114300" cy="127000"/>
-          </a:xfrm>
-          <a:prstGeom prst="ellipse">
-            <a:avLst/>
-          </a:prstGeom>
-        </p:spPr>
-        <p:style>
-          <a:lnRef idx="2">
-            <a:schemeClr val="accent1">
-              <a:shade val="50000"/>
-            </a:schemeClr>
-          </a:lnRef>
-          <a:fillRef idx="1">
-            <a:schemeClr val="accent1"/>
-          </a:fillRef>
-          <a:effectRef idx="0">
-            <a:schemeClr val="accent1"/>
-          </a:effectRef>
-          <a:fontRef idx="minor">
-            <a:schemeClr val="lt1"/>
-          </a:fontRef>
-        </p:style>
-        <p:txBody>
-          <a:bodyPr rtlCol="0" anchor="ctr"/>
-          <a:lstStyle/>
-          <a:p>
-            <a:pPr algn="ctr"/>
-            <a:endParaRPr lang="de-DE"/>
-          </a:p>
-        </p:txBody>
-      </p:sp>
       <p:cxnSp>
         <p:nvCxnSpPr>
           <p:cNvPr id="14" name="Gerader Verbinder 13"/>
@@ -4428,7 +4168,7 @@
           <a:lstStyle/>
           <a:p>
             <a:r>
-              <a:rPr lang="de-DE" dirty="0" err="1" smtClean="0"/>
+              <a:rPr lang="de-DE" dirty="0" err="1"/>
               <a:t>sweep</a:t>
             </a:r>
             <a:endParaRPr lang="de-DE" dirty="0"/>
@@ -4491,7 +4231,7 @@
           <a:lstStyle/>
           <a:p>
             <a:r>
-              <a:rPr lang="de-DE" dirty="0" err="1" smtClean="0"/>
+              <a:rPr lang="de-DE" dirty="0" err="1"/>
               <a:t>feed</a:t>
             </a:r>
             <a:endParaRPr lang="de-DE" dirty="0"/>
@@ -4564,6 +4304,566 @@
           </a:fontRef>
         </p:style>
       </p:cxnSp>
+      <p:grpSp>
+        <p:nvGrpSpPr>
+          <p:cNvPr id="46" name="Gruppieren 45"/>
+          <p:cNvGrpSpPr/>
+          <p:nvPr/>
+        </p:nvGrpSpPr>
+        <p:grpSpPr>
+          <a:xfrm>
+            <a:off x="7731614" y="636052"/>
+            <a:ext cx="4343400" cy="1904040"/>
+            <a:chOff x="7378700" y="731519"/>
+            <a:chExt cx="4343400" cy="1904040"/>
+          </a:xfrm>
+        </p:grpSpPr>
+        <p:sp>
+          <p:nvSpPr>
+            <p:cNvPr id="4" name="Rechteck 3"/>
+            <p:cNvSpPr/>
+            <p:nvPr/>
+          </p:nvSpPr>
+          <p:spPr>
+            <a:xfrm>
+              <a:off x="7378700" y="731519"/>
+              <a:ext cx="4343400" cy="1904040"/>
+            </a:xfrm>
+            <a:prstGeom prst="rect">
+              <a:avLst/>
+            </a:prstGeom>
+            <a:solidFill>
+              <a:schemeClr val="bg1"/>
+            </a:solidFill>
+            <a:ln>
+              <a:solidFill>
+                <a:schemeClr val="tx1"/>
+              </a:solidFill>
+            </a:ln>
+          </p:spPr>
+          <p:style>
+            <a:lnRef idx="2">
+              <a:schemeClr val="accent1">
+                <a:shade val="50000"/>
+              </a:schemeClr>
+            </a:lnRef>
+            <a:fillRef idx="1">
+              <a:schemeClr val="accent1"/>
+            </a:fillRef>
+            <a:effectRef idx="0">
+              <a:schemeClr val="accent1"/>
+            </a:effectRef>
+            <a:fontRef idx="minor">
+              <a:schemeClr val="lt1"/>
+            </a:fontRef>
+          </p:style>
+          <p:txBody>
+            <a:bodyPr rtlCol="0" anchor="ctr"/>
+            <a:lstStyle/>
+            <a:p>
+              <a:pPr algn="ctr"/>
+              <a:endParaRPr lang="de-DE" dirty="0"/>
+            </a:p>
+          </p:txBody>
+        </p:sp>
+        <p:sp>
+          <p:nvSpPr>
+            <p:cNvPr id="5" name="Ellipse 4"/>
+            <p:cNvSpPr/>
+            <p:nvPr/>
+          </p:nvSpPr>
+          <p:spPr>
+            <a:xfrm>
+              <a:off x="9493250" y="914400"/>
+              <a:ext cx="114300" cy="127000"/>
+            </a:xfrm>
+            <a:prstGeom prst="ellipse">
+              <a:avLst/>
+            </a:prstGeom>
+          </p:spPr>
+          <p:style>
+            <a:lnRef idx="2">
+              <a:schemeClr val="accent1">
+                <a:shade val="50000"/>
+              </a:schemeClr>
+            </a:lnRef>
+            <a:fillRef idx="1">
+              <a:schemeClr val="accent1"/>
+            </a:fillRef>
+            <a:effectRef idx="0">
+              <a:schemeClr val="accent1"/>
+            </a:effectRef>
+            <a:fontRef idx="minor">
+              <a:schemeClr val="lt1"/>
+            </a:fontRef>
+          </p:style>
+          <p:txBody>
+            <a:bodyPr rtlCol="0" anchor="ctr"/>
+            <a:lstStyle/>
+            <a:p>
+              <a:pPr algn="ctr"/>
+              <a:endParaRPr lang="de-DE"/>
+            </a:p>
+          </p:txBody>
+        </p:sp>
+        <p:sp>
+          <p:nvSpPr>
+            <p:cNvPr id="6" name="Ellipse 5"/>
+            <p:cNvSpPr/>
+            <p:nvPr/>
+          </p:nvSpPr>
+          <p:spPr>
+            <a:xfrm>
+              <a:off x="9505950" y="2311400"/>
+              <a:ext cx="114300" cy="127000"/>
+            </a:xfrm>
+            <a:prstGeom prst="ellipse">
+              <a:avLst/>
+            </a:prstGeom>
+          </p:spPr>
+          <p:style>
+            <a:lnRef idx="2">
+              <a:schemeClr val="accent1">
+                <a:shade val="50000"/>
+              </a:schemeClr>
+            </a:lnRef>
+            <a:fillRef idx="1">
+              <a:schemeClr val="accent1"/>
+            </a:fillRef>
+            <a:effectRef idx="0">
+              <a:schemeClr val="accent1"/>
+            </a:effectRef>
+            <a:fontRef idx="minor">
+              <a:schemeClr val="lt1"/>
+            </a:fontRef>
+          </p:style>
+          <p:txBody>
+            <a:bodyPr rtlCol="0" anchor="ctr"/>
+            <a:lstStyle/>
+            <a:p>
+              <a:pPr algn="ctr"/>
+              <a:endParaRPr lang="de-DE"/>
+            </a:p>
+          </p:txBody>
+        </p:sp>
+        <p:sp>
+          <p:nvSpPr>
+            <p:cNvPr id="7" name="Ellipse 6"/>
+            <p:cNvSpPr/>
+            <p:nvPr/>
+          </p:nvSpPr>
+          <p:spPr>
+            <a:xfrm>
+              <a:off x="11366500" y="1612900"/>
+              <a:ext cx="114300" cy="127000"/>
+            </a:xfrm>
+            <a:prstGeom prst="ellipse">
+              <a:avLst/>
+            </a:prstGeom>
+          </p:spPr>
+          <p:style>
+            <a:lnRef idx="2">
+              <a:schemeClr val="accent1">
+                <a:shade val="50000"/>
+              </a:schemeClr>
+            </a:lnRef>
+            <a:fillRef idx="1">
+              <a:schemeClr val="accent1"/>
+            </a:fillRef>
+            <a:effectRef idx="0">
+              <a:schemeClr val="accent1"/>
+            </a:effectRef>
+            <a:fontRef idx="minor">
+              <a:schemeClr val="lt1"/>
+            </a:fontRef>
+          </p:style>
+          <p:txBody>
+            <a:bodyPr rtlCol="0" anchor="ctr"/>
+            <a:lstStyle/>
+            <a:p>
+              <a:pPr algn="ctr"/>
+              <a:endParaRPr lang="de-DE"/>
+            </a:p>
+          </p:txBody>
+        </p:sp>
+        <p:sp>
+          <p:nvSpPr>
+            <p:cNvPr id="8" name="Ellipse 7"/>
+            <p:cNvSpPr/>
+            <p:nvPr/>
+          </p:nvSpPr>
+          <p:spPr>
+            <a:xfrm>
+              <a:off x="7620000" y="1612900"/>
+              <a:ext cx="114300" cy="127000"/>
+            </a:xfrm>
+            <a:prstGeom prst="ellipse">
+              <a:avLst/>
+            </a:prstGeom>
+          </p:spPr>
+          <p:style>
+            <a:lnRef idx="2">
+              <a:schemeClr val="accent1">
+                <a:shade val="50000"/>
+              </a:schemeClr>
+            </a:lnRef>
+            <a:fillRef idx="1">
+              <a:schemeClr val="accent1"/>
+            </a:fillRef>
+            <a:effectRef idx="0">
+              <a:schemeClr val="accent1"/>
+            </a:effectRef>
+            <a:fontRef idx="minor">
+              <a:schemeClr val="lt1"/>
+            </a:fontRef>
+          </p:style>
+          <p:txBody>
+            <a:bodyPr rtlCol="0" anchor="ctr"/>
+            <a:lstStyle/>
+            <a:p>
+              <a:pPr algn="ctr"/>
+              <a:endParaRPr lang="de-DE"/>
+            </a:p>
+          </p:txBody>
+        </p:sp>
+        <p:sp>
+          <p:nvSpPr>
+            <p:cNvPr id="9" name="Ellipse 8"/>
+            <p:cNvSpPr/>
+            <p:nvPr/>
+          </p:nvSpPr>
+          <p:spPr>
+            <a:xfrm>
+              <a:off x="9493250" y="1612900"/>
+              <a:ext cx="114300" cy="127000"/>
+            </a:xfrm>
+            <a:prstGeom prst="ellipse">
+              <a:avLst/>
+            </a:prstGeom>
+          </p:spPr>
+          <p:style>
+            <a:lnRef idx="2">
+              <a:schemeClr val="accent1">
+                <a:shade val="50000"/>
+              </a:schemeClr>
+            </a:lnRef>
+            <a:fillRef idx="1">
+              <a:schemeClr val="accent1"/>
+            </a:fillRef>
+            <a:effectRef idx="0">
+              <a:schemeClr val="accent1"/>
+            </a:effectRef>
+            <a:fontRef idx="minor">
+              <a:schemeClr val="lt1"/>
+            </a:fontRef>
+          </p:style>
+          <p:txBody>
+            <a:bodyPr rtlCol="0" anchor="ctr"/>
+            <a:lstStyle/>
+            <a:p>
+              <a:pPr algn="ctr"/>
+              <a:endParaRPr lang="de-DE"/>
+            </a:p>
+          </p:txBody>
+        </p:sp>
+        <p:cxnSp>
+          <p:nvCxnSpPr>
+            <p:cNvPr id="3" name="Gerade Verbindung mit Pfeil 2"/>
+            <p:cNvCxnSpPr/>
+            <p:nvPr/>
+          </p:nvCxnSpPr>
+          <p:spPr>
+            <a:xfrm flipV="1">
+              <a:off x="7677150" y="977900"/>
+              <a:ext cx="0" cy="1397000"/>
+            </a:xfrm>
+            <a:prstGeom prst="straightConnector1">
+              <a:avLst/>
+            </a:prstGeom>
+            <a:ln>
+              <a:tailEnd type="triangle"/>
+            </a:ln>
+          </p:spPr>
+          <p:style>
+            <a:lnRef idx="1">
+              <a:schemeClr val="accent1"/>
+            </a:lnRef>
+            <a:fillRef idx="0">
+              <a:schemeClr val="accent1"/>
+            </a:fillRef>
+            <a:effectRef idx="0">
+              <a:schemeClr val="accent1"/>
+            </a:effectRef>
+            <a:fontRef idx="minor">
+              <a:schemeClr val="tx1"/>
+            </a:fontRef>
+          </p:style>
+        </p:cxnSp>
+        <p:cxnSp>
+          <p:nvCxnSpPr>
+            <p:cNvPr id="21" name="Gerade Verbindung mit Pfeil 20"/>
+            <p:cNvCxnSpPr/>
+            <p:nvPr/>
+          </p:nvCxnSpPr>
+          <p:spPr>
+            <a:xfrm>
+              <a:off x="7677150" y="2374900"/>
+              <a:ext cx="3956358" cy="0"/>
+            </a:xfrm>
+            <a:prstGeom prst="straightConnector1">
+              <a:avLst/>
+            </a:prstGeom>
+            <a:ln>
+              <a:tailEnd type="triangle"/>
+            </a:ln>
+          </p:spPr>
+          <p:style>
+            <a:lnRef idx="1">
+              <a:schemeClr val="accent1"/>
+            </a:lnRef>
+            <a:fillRef idx="0">
+              <a:schemeClr val="accent1"/>
+            </a:fillRef>
+            <a:effectRef idx="0">
+              <a:schemeClr val="accent1"/>
+            </a:effectRef>
+            <a:fontRef idx="minor">
+              <a:schemeClr val="tx1"/>
+            </a:fontRef>
+          </p:style>
+        </p:cxnSp>
+        <p:sp>
+          <p:nvSpPr>
+            <p:cNvPr id="37" name="Textfeld 36"/>
+            <p:cNvSpPr txBox="1"/>
+            <p:nvPr/>
+          </p:nvSpPr>
+          <p:spPr>
+            <a:xfrm>
+              <a:off x="7435850" y="856734"/>
+              <a:ext cx="241300" cy="369332"/>
+            </a:xfrm>
+            <a:prstGeom prst="rect">
+              <a:avLst/>
+            </a:prstGeom>
+            <a:noFill/>
+          </p:spPr>
+          <p:txBody>
+            <a:bodyPr wrap="square" rtlCol="0">
+              <a:spAutoFit/>
+            </a:bodyPr>
+            <a:lstStyle/>
+            <a:p>
+              <a:r>
+                <a:rPr lang="de-DE" dirty="0">
+                  <a:solidFill>
+                    <a:srgbClr val="00B0F0"/>
+                  </a:solidFill>
+                </a:rPr>
+                <a:t>x</a:t>
+              </a:r>
+            </a:p>
+          </p:txBody>
+        </p:sp>
+        <p:sp>
+          <p:nvSpPr>
+            <p:cNvPr id="40" name="Textfeld 39"/>
+            <p:cNvSpPr txBox="1"/>
+            <p:nvPr/>
+          </p:nvSpPr>
+          <p:spPr>
+            <a:xfrm>
+              <a:off x="11408733" y="1996034"/>
+              <a:ext cx="267008" cy="369332"/>
+            </a:xfrm>
+            <a:prstGeom prst="rect">
+              <a:avLst/>
+            </a:prstGeom>
+            <a:noFill/>
+          </p:spPr>
+          <p:txBody>
+            <a:bodyPr wrap="square" rtlCol="0">
+              <a:spAutoFit/>
+            </a:bodyPr>
+            <a:lstStyle/>
+            <a:p>
+              <a:r>
+                <a:rPr lang="de-DE" dirty="0">
+                  <a:solidFill>
+                    <a:srgbClr val="00B0F0"/>
+                  </a:solidFill>
+                </a:rPr>
+                <a:t>y</a:t>
+              </a:r>
+            </a:p>
+          </p:txBody>
+        </p:sp>
+        <p:sp>
+          <p:nvSpPr>
+            <p:cNvPr id="41" name="Textfeld 40"/>
+            <p:cNvSpPr txBox="1"/>
+            <p:nvPr/>
+          </p:nvSpPr>
+          <p:spPr>
+            <a:xfrm>
+              <a:off x="9096668" y="1491734"/>
+              <a:ext cx="376507" cy="369332"/>
+            </a:xfrm>
+            <a:prstGeom prst="rect">
+              <a:avLst/>
+            </a:prstGeom>
+            <a:noFill/>
+          </p:spPr>
+          <p:txBody>
+            <a:bodyPr wrap="square" rtlCol="0">
+              <a:spAutoFit/>
+            </a:bodyPr>
+            <a:lstStyle/>
+            <a:p>
+              <a:r>
+                <a:rPr lang="de-DE" dirty="0">
+                  <a:solidFill>
+                    <a:srgbClr val="00B0F0"/>
+                  </a:solidFill>
+                </a:rPr>
+                <a:t>m</a:t>
+              </a:r>
+            </a:p>
+          </p:txBody>
+        </p:sp>
+        <p:sp>
+          <p:nvSpPr>
+            <p:cNvPr id="42" name="Textfeld 41"/>
+            <p:cNvSpPr txBox="1"/>
+            <p:nvPr/>
+          </p:nvSpPr>
+          <p:spPr>
+            <a:xfrm>
+              <a:off x="9166433" y="798770"/>
+              <a:ext cx="376507" cy="369332"/>
+            </a:xfrm>
+            <a:prstGeom prst="rect">
+              <a:avLst/>
+            </a:prstGeom>
+            <a:noFill/>
+          </p:spPr>
+          <p:txBody>
+            <a:bodyPr wrap="square" rtlCol="0">
+              <a:spAutoFit/>
+            </a:bodyPr>
+            <a:lstStyle/>
+            <a:p>
+              <a:r>
+                <a:rPr lang="de-DE" dirty="0">
+                  <a:solidFill>
+                    <a:srgbClr val="00B0F0"/>
+                  </a:solidFill>
+                </a:rPr>
+                <a:t>o</a:t>
+              </a:r>
+            </a:p>
+          </p:txBody>
+        </p:sp>
+        <p:sp>
+          <p:nvSpPr>
+            <p:cNvPr id="43" name="Textfeld 42"/>
+            <p:cNvSpPr txBox="1"/>
+            <p:nvPr/>
+          </p:nvSpPr>
+          <p:spPr>
+            <a:xfrm>
+              <a:off x="9171748" y="2115035"/>
+              <a:ext cx="226345" cy="369332"/>
+            </a:xfrm>
+            <a:prstGeom prst="rect">
+              <a:avLst/>
+            </a:prstGeom>
+            <a:noFill/>
+          </p:spPr>
+          <p:txBody>
+            <a:bodyPr wrap="square" rtlCol="0">
+              <a:spAutoFit/>
+            </a:bodyPr>
+            <a:lstStyle/>
+            <a:p>
+              <a:r>
+                <a:rPr lang="de-DE" dirty="0">
+                  <a:solidFill>
+                    <a:srgbClr val="00B0F0"/>
+                  </a:solidFill>
+                </a:rPr>
+                <a:t>u</a:t>
+              </a:r>
+            </a:p>
+          </p:txBody>
+        </p:sp>
+        <p:sp>
+          <p:nvSpPr>
+            <p:cNvPr id="44" name="Textfeld 43"/>
+            <p:cNvSpPr txBox="1"/>
+            <p:nvPr/>
+          </p:nvSpPr>
+          <p:spPr>
+            <a:xfrm>
+              <a:off x="7435850" y="1498873"/>
+              <a:ext cx="256625" cy="369332"/>
+            </a:xfrm>
+            <a:prstGeom prst="rect">
+              <a:avLst/>
+            </a:prstGeom>
+            <a:noFill/>
+          </p:spPr>
+          <p:txBody>
+            <a:bodyPr wrap="square" rtlCol="0">
+              <a:spAutoFit/>
+            </a:bodyPr>
+            <a:lstStyle/>
+            <a:p>
+              <a:r>
+                <a:rPr lang="de-DE" dirty="0">
+                  <a:solidFill>
+                    <a:srgbClr val="00B0F0"/>
+                  </a:solidFill>
+                </a:rPr>
+                <a:t>l</a:t>
+              </a:r>
+            </a:p>
+          </p:txBody>
+        </p:sp>
+        <p:sp>
+          <p:nvSpPr>
+            <p:cNvPr id="45" name="Textfeld 44"/>
+            <p:cNvSpPr txBox="1"/>
+            <p:nvPr/>
+          </p:nvSpPr>
+          <p:spPr>
+            <a:xfrm>
+              <a:off x="11148431" y="1501791"/>
+              <a:ext cx="272025" cy="369332"/>
+            </a:xfrm>
+            <a:prstGeom prst="rect">
+              <a:avLst/>
+            </a:prstGeom>
+            <a:noFill/>
+          </p:spPr>
+          <p:txBody>
+            <a:bodyPr wrap="square" rtlCol="0">
+              <a:spAutoFit/>
+            </a:bodyPr>
+            <a:lstStyle/>
+            <a:p>
+              <a:r>
+                <a:rPr lang="de-DE" dirty="0">
+                  <a:solidFill>
+                    <a:srgbClr val="00B0F0"/>
+                  </a:solidFill>
+                </a:rPr>
+                <a:t>r</a:t>
+              </a:r>
+            </a:p>
+          </p:txBody>
+        </p:sp>
+      </p:grpSp>
     </p:spTree>
     <p:extLst>
       <p:ext uri="{BB962C8B-B14F-4D97-AF65-F5344CB8AC3E}">
@@ -4717,18 +5017,13 @@
             <a:p>
               <a:pPr algn="ctr"/>
               <a:r>
-                <a:rPr lang="de-DE" dirty="0" smtClean="0">
+                <a:rPr lang="de-DE" dirty="0">
                   <a:solidFill>
                     <a:schemeClr val="tx1"/>
                   </a:solidFill>
                 </a:rPr>
                 <a:t>Anströmfläche</a:t>
               </a:r>
-              <a:endParaRPr lang="de-DE" dirty="0">
-                <a:solidFill>
-                  <a:schemeClr val="tx1"/>
-                </a:solidFill>
-              </a:endParaRPr>
             </a:p>
           </p:txBody>
         </p:sp>
@@ -4808,18 +5103,13 @@
             <a:p>
               <a:pPr algn="ctr"/>
               <a:r>
-                <a:rPr lang="de-DE" dirty="0" smtClean="0">
+                <a:rPr lang="de-DE" dirty="0">
                   <a:solidFill>
                     <a:schemeClr val="tx1"/>
                   </a:solidFill>
                 </a:rPr>
                 <a:t>Lochblech</a:t>
               </a:r>
-              <a:endParaRPr lang="de-DE" dirty="0">
-                <a:solidFill>
-                  <a:schemeClr val="tx1"/>
-                </a:solidFill>
-              </a:endParaRPr>
             </a:p>
           </p:txBody>
         </p:sp>

</xml_diff>